<commit_message>
Updates to L18 in lieu of different MT2 schedule.
</commit_message>
<xml_diff>
--- a/instructor/l18/l18-pad.pptx
+++ b/instructor/l18/l18-pad.pptx
@@ -269,7 +269,7 @@
           <a:p>
             <a:fld id="{B259A58A-5D35-C149-92D6-90CB95B83E4C}" type="datetimeFigureOut">
               <a:rPr lang="en-US" smtClean="0"/>
-              <a:t>11/13/24</a:t>
+              <a:t>11/18/25</a:t>
             </a:fld>
             <a:endParaRPr lang="en-US"/>
           </a:p>
@@ -467,7 +467,7 @@
           <a:p>
             <a:fld id="{B259A58A-5D35-C149-92D6-90CB95B83E4C}" type="datetimeFigureOut">
               <a:rPr lang="en-US" smtClean="0"/>
-              <a:t>11/13/24</a:t>
+              <a:t>11/18/25</a:t>
             </a:fld>
             <a:endParaRPr lang="en-US"/>
           </a:p>
@@ -675,7 +675,7 @@
           <a:p>
             <a:fld id="{B259A58A-5D35-C149-92D6-90CB95B83E4C}" type="datetimeFigureOut">
               <a:rPr lang="en-US" smtClean="0"/>
-              <a:t>11/13/24</a:t>
+              <a:t>11/18/25</a:t>
             </a:fld>
             <a:endParaRPr lang="en-US"/>
           </a:p>
@@ -873,7 +873,7 @@
           <a:p>
             <a:fld id="{B259A58A-5D35-C149-92D6-90CB95B83E4C}" type="datetimeFigureOut">
               <a:rPr lang="en-US" smtClean="0"/>
-              <a:t>11/13/24</a:t>
+              <a:t>11/18/25</a:t>
             </a:fld>
             <a:endParaRPr lang="en-US"/>
           </a:p>
@@ -1148,7 +1148,7 @@
           <a:p>
             <a:fld id="{B259A58A-5D35-C149-92D6-90CB95B83E4C}" type="datetimeFigureOut">
               <a:rPr lang="en-US" smtClean="0"/>
-              <a:t>11/13/24</a:t>
+              <a:t>11/18/25</a:t>
             </a:fld>
             <a:endParaRPr lang="en-US"/>
           </a:p>
@@ -1413,7 +1413,7 @@
           <a:p>
             <a:fld id="{B259A58A-5D35-C149-92D6-90CB95B83E4C}" type="datetimeFigureOut">
               <a:rPr lang="en-US" smtClean="0"/>
-              <a:t>11/13/24</a:t>
+              <a:t>11/18/25</a:t>
             </a:fld>
             <a:endParaRPr lang="en-US"/>
           </a:p>
@@ -1825,7 +1825,7 @@
           <a:p>
             <a:fld id="{B259A58A-5D35-C149-92D6-90CB95B83E4C}" type="datetimeFigureOut">
               <a:rPr lang="en-US" smtClean="0"/>
-              <a:t>11/13/24</a:t>
+              <a:t>11/18/25</a:t>
             </a:fld>
             <a:endParaRPr lang="en-US"/>
           </a:p>
@@ -1966,7 +1966,7 @@
           <a:p>
             <a:fld id="{B259A58A-5D35-C149-92D6-90CB95B83E4C}" type="datetimeFigureOut">
               <a:rPr lang="en-US" smtClean="0"/>
-              <a:t>11/13/24</a:t>
+              <a:t>11/18/25</a:t>
             </a:fld>
             <a:endParaRPr lang="en-US"/>
           </a:p>
@@ -2079,7 +2079,7 @@
           <a:p>
             <a:fld id="{B259A58A-5D35-C149-92D6-90CB95B83E4C}" type="datetimeFigureOut">
               <a:rPr lang="en-US" smtClean="0"/>
-              <a:t>11/13/24</a:t>
+              <a:t>11/18/25</a:t>
             </a:fld>
             <a:endParaRPr lang="en-US"/>
           </a:p>
@@ -2390,7 +2390,7 @@
           <a:p>
             <a:fld id="{B259A58A-5D35-C149-92D6-90CB95B83E4C}" type="datetimeFigureOut">
               <a:rPr lang="en-US" smtClean="0"/>
-              <a:t>11/13/24</a:t>
+              <a:t>11/18/25</a:t>
             </a:fld>
             <a:endParaRPr lang="en-US"/>
           </a:p>
@@ -2678,7 +2678,7 @@
           <a:p>
             <a:fld id="{B259A58A-5D35-C149-92D6-90CB95B83E4C}" type="datetimeFigureOut">
               <a:rPr lang="en-US" smtClean="0"/>
-              <a:t>11/13/24</a:t>
+              <a:t>11/18/25</a:t>
             </a:fld>
             <a:endParaRPr lang="en-US"/>
           </a:p>
@@ -2919,7 +2919,7 @@
           <a:p>
             <a:fld id="{B259A58A-5D35-C149-92D6-90CB95B83E4C}" type="datetimeFigureOut">
               <a:rPr lang="en-US" smtClean="0"/>
-              <a:t>11/13/24</a:t>
+              <a:t>11/18/25</a:t>
             </a:fld>
             <a:endParaRPr lang="en-US"/>
           </a:p>
@@ -3320,7 +3320,7 @@
 </file>
 
 <file path=ppt/slides/slide1.xml><?xml version="1.0" encoding="utf-8"?>
-<p:sld xmlns:a="http://schemas.openxmlformats.org/drawingml/2006/main" xmlns:r="http://schemas.openxmlformats.org/officeDocument/2006/relationships" xmlns:p="http://schemas.openxmlformats.org/presentationml/2006/main">
+<p:sld xmlns:a="http://schemas.openxmlformats.org/drawingml/2006/main" xmlns:r="http://schemas.openxmlformats.org/officeDocument/2006/relationships" xmlns:p="http://schemas.openxmlformats.org/presentationml/2006/main" show="0">
   <p:cSld>
     <p:spTree>
       <p:nvGrpSpPr>
@@ -4944,7 +4944,7 @@
 </file>
 
 <file path=ppt/slides/slide2.xml><?xml version="1.0" encoding="utf-8"?>
-<p:sld xmlns:a="http://schemas.openxmlformats.org/drawingml/2006/main" xmlns:r="http://schemas.openxmlformats.org/officeDocument/2006/relationships" xmlns:p="http://schemas.openxmlformats.org/presentationml/2006/main">
+<p:sld xmlns:a="http://schemas.openxmlformats.org/drawingml/2006/main" xmlns:r="http://schemas.openxmlformats.org/officeDocument/2006/relationships" xmlns:p="http://schemas.openxmlformats.org/presentationml/2006/main" show="0">
   <p:cSld>
     <p:spTree>
       <p:nvGrpSpPr>

</xml_diff>